<commit_message>
Added The Source Code with modifications
</commit_message>
<xml_diff>
--- a/Documentation/Team_13_IEEE_PPT.pptx
+++ b/Documentation/Team_13_IEEE_PPT.pptx
@@ -6,7 +6,7 @@
     <p:sldMasterId id="2147483660" r:id="rId2"/>
   </p:sldMasterIdLst>
   <p:notesMasterIdLst>
-    <p:notesMasterId r:id="rId26"/>
+    <p:notesMasterId r:id="rId25"/>
   </p:notesMasterIdLst>
   <p:sldIdLst>
     <p:sldId id="273" r:id="rId3"/>
@@ -19,19 +19,18 @@
     <p:sldId id="282" r:id="rId10"/>
     <p:sldId id="283" r:id="rId11"/>
     <p:sldId id="284" r:id="rId12"/>
-    <p:sldId id="285" r:id="rId13"/>
-    <p:sldId id="263" r:id="rId14"/>
-    <p:sldId id="264" r:id="rId15"/>
-    <p:sldId id="278" r:id="rId16"/>
-    <p:sldId id="265" r:id="rId17"/>
-    <p:sldId id="266" r:id="rId18"/>
-    <p:sldId id="267" r:id="rId19"/>
-    <p:sldId id="270" r:id="rId20"/>
-    <p:sldId id="269" r:id="rId21"/>
-    <p:sldId id="259" r:id="rId22"/>
-    <p:sldId id="260" r:id="rId23"/>
-    <p:sldId id="261" r:id="rId24"/>
-    <p:sldId id="271" r:id="rId25"/>
+    <p:sldId id="263" r:id="rId13"/>
+    <p:sldId id="264" r:id="rId14"/>
+    <p:sldId id="278" r:id="rId15"/>
+    <p:sldId id="265" r:id="rId16"/>
+    <p:sldId id="266" r:id="rId17"/>
+    <p:sldId id="267" r:id="rId18"/>
+    <p:sldId id="270" r:id="rId19"/>
+    <p:sldId id="269" r:id="rId20"/>
+    <p:sldId id="259" r:id="rId21"/>
+    <p:sldId id="260" r:id="rId22"/>
+    <p:sldId id="261" r:id="rId23"/>
+    <p:sldId id="271" r:id="rId24"/>
   </p:sldIdLst>
   <p:sldSz cx="9144000" cy="6858000" type="screen4x3"/>
   <p:notesSz cx="6858000" cy="9144000"/>
@@ -231,7 +230,7 @@
           <a:p>
             <a:fld id="{6A408A42-8110-7F4B-8B5D-8E63E83FB20C}" type="datetimeFigureOut">
               <a:rPr lang="en-US" smtClean="0"/>
-              <a:t>11/28/2016</a:t>
+              <a:t>11/29/2016</a:t>
             </a:fld>
             <a:endParaRPr lang="en-US"/>
           </a:p>
@@ -647,7 +646,7 @@
           <a:p>
             <a:fld id="{4989D2A8-80AF-A04A-8712-B8C3DD67BF6B}" type="slidenum">
               <a:rPr lang="en-US" smtClean="0"/>
-              <a:t>19</a:t>
+              <a:t>18</a:t>
             </a:fld>
             <a:endParaRPr lang="en-US"/>
           </a:p>
@@ -845,7 +844,7 @@
           <a:p>
             <a:fld id="{49DBEA4D-F3C4-4046-BB47-FCB1207B26B3}" type="datetimeFigureOut">
               <a:rPr lang="en-US" smtClean="0"/>
-              <a:t>11/28/2016</a:t>
+              <a:t>11/29/2016</a:t>
             </a:fld>
             <a:endParaRPr lang="en-US"/>
           </a:p>
@@ -1013,7 +1012,7 @@
           <a:p>
             <a:fld id="{49DBEA4D-F3C4-4046-BB47-FCB1207B26B3}" type="datetimeFigureOut">
               <a:rPr lang="en-US" smtClean="0"/>
-              <a:t>11/28/2016</a:t>
+              <a:t>11/29/2016</a:t>
             </a:fld>
             <a:endParaRPr lang="en-US"/>
           </a:p>
@@ -1191,7 +1190,7 @@
           <a:p>
             <a:fld id="{49DBEA4D-F3C4-4046-BB47-FCB1207B26B3}" type="datetimeFigureOut">
               <a:rPr lang="en-US" smtClean="0"/>
-              <a:t>11/28/2016</a:t>
+              <a:t>11/29/2016</a:t>
             </a:fld>
             <a:endParaRPr lang="en-US"/>
           </a:p>
@@ -1441,7 +1440,7 @@
           <a:p>
             <a:fld id="{CB151F00-3264-D74A-9603-89B73FD0711A}" type="datetimeFigureOut">
               <a:rPr lang="en-US" smtClean="0"/>
-              <a:t>11/28/2016</a:t>
+              <a:t>11/29/2016</a:t>
             </a:fld>
             <a:endParaRPr lang="en-US"/>
           </a:p>
@@ -1609,7 +1608,7 @@
           <a:p>
             <a:fld id="{CB151F00-3264-D74A-9603-89B73FD0711A}" type="datetimeFigureOut">
               <a:rPr lang="en-US" smtClean="0"/>
-              <a:t>11/28/2016</a:t>
+              <a:t>11/29/2016</a:t>
             </a:fld>
             <a:endParaRPr lang="en-US"/>
           </a:p>
@@ -1854,7 +1853,7 @@
           <a:p>
             <a:fld id="{CB151F00-3264-D74A-9603-89B73FD0711A}" type="datetimeFigureOut">
               <a:rPr lang="en-US" smtClean="0"/>
-              <a:t>11/28/2016</a:t>
+              <a:t>11/29/2016</a:t>
             </a:fld>
             <a:endParaRPr lang="en-US"/>
           </a:p>
@@ -2139,7 +2138,7 @@
           <a:p>
             <a:fld id="{CB151F00-3264-D74A-9603-89B73FD0711A}" type="datetimeFigureOut">
               <a:rPr lang="en-US" smtClean="0"/>
-              <a:t>11/28/2016</a:t>
+              <a:t>11/29/2016</a:t>
             </a:fld>
             <a:endParaRPr lang="en-US"/>
           </a:p>
@@ -2558,7 +2557,7 @@
           <a:p>
             <a:fld id="{CB151F00-3264-D74A-9603-89B73FD0711A}" type="datetimeFigureOut">
               <a:rPr lang="en-US" smtClean="0"/>
-              <a:t>11/28/2016</a:t>
+              <a:t>11/29/2016</a:t>
             </a:fld>
             <a:endParaRPr lang="en-US"/>
           </a:p>
@@ -2675,7 +2674,7 @@
           <a:p>
             <a:fld id="{CB151F00-3264-D74A-9603-89B73FD0711A}" type="datetimeFigureOut">
               <a:rPr lang="en-US" smtClean="0"/>
-              <a:t>11/28/2016</a:t>
+              <a:t>11/29/2016</a:t>
             </a:fld>
             <a:endParaRPr lang="en-US"/>
           </a:p>
@@ -2770,7 +2769,7 @@
           <a:p>
             <a:fld id="{CB151F00-3264-D74A-9603-89B73FD0711A}" type="datetimeFigureOut">
               <a:rPr lang="en-US" smtClean="0"/>
-              <a:t>11/28/2016</a:t>
+              <a:t>11/29/2016</a:t>
             </a:fld>
             <a:endParaRPr lang="en-US"/>
           </a:p>
@@ -3045,7 +3044,7 @@
           <a:p>
             <a:fld id="{CB151F00-3264-D74A-9603-89B73FD0711A}" type="datetimeFigureOut">
               <a:rPr lang="en-US" smtClean="0"/>
-              <a:t>11/28/2016</a:t>
+              <a:t>11/29/2016</a:t>
             </a:fld>
             <a:endParaRPr lang="en-US"/>
           </a:p>
@@ -3213,7 +3212,7 @@
           <a:p>
             <a:fld id="{49DBEA4D-F3C4-4046-BB47-FCB1207B26B3}" type="datetimeFigureOut">
               <a:rPr lang="en-US" smtClean="0"/>
-              <a:t>11/28/2016</a:t>
+              <a:t>11/29/2016</a:t>
             </a:fld>
             <a:endParaRPr lang="en-US"/>
           </a:p>
@@ -3465,7 +3464,7 @@
           <a:p>
             <a:fld id="{CB151F00-3264-D74A-9603-89B73FD0711A}" type="datetimeFigureOut">
               <a:rPr lang="en-US" smtClean="0"/>
-              <a:t>11/28/2016</a:t>
+              <a:t>11/29/2016</a:t>
             </a:fld>
             <a:endParaRPr lang="en-US"/>
           </a:p>
@@ -3633,7 +3632,7 @@
           <a:p>
             <a:fld id="{CB151F00-3264-D74A-9603-89B73FD0711A}" type="datetimeFigureOut">
               <a:rPr lang="en-US" smtClean="0"/>
-              <a:t>11/28/2016</a:t>
+              <a:t>11/29/2016</a:t>
             </a:fld>
             <a:endParaRPr lang="en-US"/>
           </a:p>
@@ -3811,7 +3810,7 @@
           <a:p>
             <a:fld id="{CB151F00-3264-D74A-9603-89B73FD0711A}" type="datetimeFigureOut">
               <a:rPr lang="en-US" smtClean="0"/>
-              <a:t>11/28/2016</a:t>
+              <a:t>11/29/2016</a:t>
             </a:fld>
             <a:endParaRPr lang="en-US"/>
           </a:p>
@@ -4056,7 +4055,7 @@
           <a:p>
             <a:fld id="{49DBEA4D-F3C4-4046-BB47-FCB1207B26B3}" type="datetimeFigureOut">
               <a:rPr lang="en-US" smtClean="0"/>
-              <a:t>11/28/2016</a:t>
+              <a:t>11/29/2016</a:t>
             </a:fld>
             <a:endParaRPr lang="en-US"/>
           </a:p>
@@ -4341,7 +4340,7 @@
           <a:p>
             <a:fld id="{49DBEA4D-F3C4-4046-BB47-FCB1207B26B3}" type="datetimeFigureOut">
               <a:rPr lang="en-US" smtClean="0"/>
-              <a:t>11/28/2016</a:t>
+              <a:t>11/29/2016</a:t>
             </a:fld>
             <a:endParaRPr lang="en-US"/>
           </a:p>
@@ -4760,7 +4759,7 @@
           <a:p>
             <a:fld id="{49DBEA4D-F3C4-4046-BB47-FCB1207B26B3}" type="datetimeFigureOut">
               <a:rPr lang="en-US" smtClean="0"/>
-              <a:t>11/28/2016</a:t>
+              <a:t>11/29/2016</a:t>
             </a:fld>
             <a:endParaRPr lang="en-US"/>
           </a:p>
@@ -4877,7 +4876,7 @@
           <a:p>
             <a:fld id="{49DBEA4D-F3C4-4046-BB47-FCB1207B26B3}" type="datetimeFigureOut">
               <a:rPr lang="en-US" smtClean="0"/>
-              <a:t>11/28/2016</a:t>
+              <a:t>11/29/2016</a:t>
             </a:fld>
             <a:endParaRPr lang="en-US"/>
           </a:p>
@@ -4972,7 +4971,7 @@
           <a:p>
             <a:fld id="{49DBEA4D-F3C4-4046-BB47-FCB1207B26B3}" type="datetimeFigureOut">
               <a:rPr lang="en-US" smtClean="0"/>
-              <a:t>11/28/2016</a:t>
+              <a:t>11/29/2016</a:t>
             </a:fld>
             <a:endParaRPr lang="en-US"/>
           </a:p>
@@ -5247,7 +5246,7 @@
           <a:p>
             <a:fld id="{49DBEA4D-F3C4-4046-BB47-FCB1207B26B3}" type="datetimeFigureOut">
               <a:rPr lang="en-US" smtClean="0"/>
-              <a:t>11/28/2016</a:t>
+              <a:t>11/29/2016</a:t>
             </a:fld>
             <a:endParaRPr lang="en-US"/>
           </a:p>
@@ -5499,7 +5498,7 @@
           <a:p>
             <a:fld id="{49DBEA4D-F3C4-4046-BB47-FCB1207B26B3}" type="datetimeFigureOut">
               <a:rPr lang="en-US" smtClean="0"/>
-              <a:t>11/28/2016</a:t>
+              <a:t>11/29/2016</a:t>
             </a:fld>
             <a:endParaRPr lang="en-US"/>
           </a:p>
@@ -5716,7 +5715,7 @@
           <a:p>
             <a:fld id="{49DBEA4D-F3C4-4046-BB47-FCB1207B26B3}" type="datetimeFigureOut">
               <a:rPr lang="en-US" smtClean="0"/>
-              <a:t>11/28/2016</a:t>
+              <a:t>11/29/2016</a:t>
             </a:fld>
             <a:endParaRPr lang="en-US"/>
           </a:p>
@@ -6230,7 +6229,7 @@
           <a:p>
             <a:fld id="{CB151F00-3264-D74A-9603-89B73FD0711A}" type="datetimeFigureOut">
               <a:rPr lang="en-US" smtClean="0"/>
-              <a:t>11/28/2016</a:t>
+              <a:t>11/29/2016</a:t>
             </a:fld>
             <a:endParaRPr lang="en-US"/>
           </a:p>
@@ -6948,159 +6947,6 @@
           <a:chExt cx="0" cy="0"/>
         </a:xfrm>
       </p:grpSpPr>
-      <p:sp>
-        <p:nvSpPr>
-          <p:cNvPr id="2" name="Title 1"/>
-          <p:cNvSpPr>
-            <a:spLocks noGrp="1"/>
-          </p:cNvSpPr>
-          <p:nvPr>
-            <p:ph type="title"/>
-          </p:nvPr>
-        </p:nvSpPr>
-        <p:spPr/>
-        <p:txBody>
-          <a:bodyPr/>
-          <a:lstStyle/>
-          <a:p>
-            <a:pPr algn="l"/>
-            <a:r>
-              <a:rPr lang="en-US" dirty="0" err="1">
-                <a:solidFill>
-                  <a:srgbClr val="0070C0"/>
-                </a:solidFill>
-                <a:latin typeface="Times New Roman" panose="02020603050405020304" pitchFamily="18" charset="0"/>
-                <a:cs typeface="Times New Roman" panose="02020603050405020304" pitchFamily="18" charset="0"/>
-              </a:rPr>
-              <a:t>Contd</a:t>
-            </a:r>
-            <a:r>
-              <a:rPr lang="en-US" dirty="0">
-                <a:solidFill>
-                  <a:srgbClr val="0070C0"/>
-                </a:solidFill>
-                <a:latin typeface="Times New Roman" panose="02020603050405020304" pitchFamily="18" charset="0"/>
-                <a:cs typeface="Times New Roman" panose="02020603050405020304" pitchFamily="18" charset="0"/>
-              </a:rPr>
-              <a:t>…</a:t>
-            </a:r>
-          </a:p>
-        </p:txBody>
-      </p:sp>
-      <p:sp>
-        <p:nvSpPr>
-          <p:cNvPr id="3" name="Content Placeholder 2"/>
-          <p:cNvSpPr>
-            <a:spLocks noGrp="1"/>
-          </p:cNvSpPr>
-          <p:nvPr>
-            <p:ph idx="1"/>
-          </p:nvPr>
-        </p:nvSpPr>
-        <p:spPr/>
-        <p:txBody>
-          <a:bodyPr/>
-          <a:lstStyle/>
-          <a:p>
-            <a:r>
-              <a:rPr lang="en-US" sz="2000" dirty="0">
-                <a:latin typeface="Times New Roman" panose="02020603050405020304" pitchFamily="18" charset="0"/>
-                <a:cs typeface="Times New Roman" panose="02020603050405020304" pitchFamily="18" charset="0"/>
-              </a:rPr>
-              <a:t>ISAM for developers and users can help them decide:</a:t>
-            </a:r>
-          </a:p>
-          <a:p>
-            <a:pPr lvl="1"/>
-            <a:r>
-              <a:rPr lang="en-US" sz="2000" dirty="0">
-                <a:latin typeface="Times New Roman" panose="02020603050405020304" pitchFamily="18" charset="0"/>
-                <a:cs typeface="Times New Roman" panose="02020603050405020304" pitchFamily="18" charset="0"/>
-              </a:rPr>
-              <a:t>where to implement new functionality,</a:t>
-            </a:r>
-          </a:p>
-          <a:p>
-            <a:pPr lvl="1"/>
-            <a:r>
-              <a:rPr lang="en-US" sz="2000" dirty="0">
-                <a:latin typeface="Times New Roman" panose="02020603050405020304" pitchFamily="18" charset="0"/>
-                <a:cs typeface="Times New Roman" panose="02020603050405020304" pitchFamily="18" charset="0"/>
-              </a:rPr>
-              <a:t>what projects and APIs to use,</a:t>
-            </a:r>
-          </a:p>
-          <a:p>
-            <a:pPr lvl="1"/>
-            <a:r>
-              <a:rPr lang="en-US" sz="2000" dirty="0">
-                <a:latin typeface="Times New Roman" panose="02020603050405020304" pitchFamily="18" charset="0"/>
-                <a:cs typeface="Times New Roman" panose="02020603050405020304" pitchFamily="18" charset="0"/>
-              </a:rPr>
-              <a:t> how to avoid disrupting users, and</a:t>
-            </a:r>
-          </a:p>
-          <a:p>
-            <a:pPr lvl="1"/>
-            <a:r>
-              <a:rPr lang="en-US" sz="2000" dirty="0">
-                <a:latin typeface="Times New Roman" panose="02020603050405020304" pitchFamily="18" charset="0"/>
-                <a:cs typeface="Times New Roman" panose="02020603050405020304" pitchFamily="18" charset="0"/>
-              </a:rPr>
-              <a:t>what activity in other repositories requires immediate attention.</a:t>
-            </a:r>
-          </a:p>
-          <a:p>
-            <a:pPr marL="457200" lvl="1" indent="0">
-              <a:buNone/>
-            </a:pPr>
-            <a:endParaRPr lang="en-US" sz="2000" dirty="0">
-              <a:latin typeface="Times New Roman" panose="02020603050405020304" pitchFamily="18" charset="0"/>
-              <a:cs typeface="Times New Roman" panose="02020603050405020304" pitchFamily="18" charset="0"/>
-            </a:endParaRPr>
-          </a:p>
-          <a:p>
-            <a:r>
-              <a:rPr lang="en-US" sz="2000" dirty="0">
-                <a:latin typeface="Times New Roman" panose="02020603050405020304" pitchFamily="18" charset="0"/>
-                <a:cs typeface="Times New Roman" panose="02020603050405020304" pitchFamily="18" charset="0"/>
-              </a:rPr>
-              <a:t>These analyses will produce additional notifications and reports that ISAM can provide in the longer run.</a:t>
-            </a:r>
-            <a:endParaRPr lang="en-US" dirty="0"/>
-          </a:p>
-        </p:txBody>
-      </p:sp>
-    </p:spTree>
-    <p:extLst>
-      <p:ext uri="{BB962C8B-B14F-4D97-AF65-F5344CB8AC3E}">
-        <p14:creationId xmlns:p14="http://schemas.microsoft.com/office/powerpoint/2010/main" val="3652508691"/>
-      </p:ext>
-    </p:extLst>
-  </p:cSld>
-  <p:clrMapOvr>
-    <a:masterClrMapping/>
-  </p:clrMapOvr>
-</p:sld>
-</file>
-
-<file path=ppt/slides/slide12.xml><?xml version="1.0" encoding="utf-8"?>
-<p:sld xmlns:a="http://schemas.openxmlformats.org/drawingml/2006/main" xmlns:r="http://schemas.openxmlformats.org/officeDocument/2006/relationships" xmlns:p="http://schemas.openxmlformats.org/presentationml/2006/main">
-  <p:cSld>
-    <p:spTree>
-      <p:nvGrpSpPr>
-        <p:cNvPr id="1" name=""/>
-        <p:cNvGrpSpPr/>
-        <p:nvPr/>
-      </p:nvGrpSpPr>
-      <p:grpSpPr>
-        <a:xfrm>
-          <a:off x="0" y="0"/>
-          <a:ext cx="0" cy="0"/>
-          <a:chOff x="0" y="0"/>
-          <a:chExt cx="0" cy="0"/>
-        </a:xfrm>
-      </p:grpSpPr>
       <p:pic>
         <p:nvPicPr>
           <p:cNvPr id="6" name="Picture 5"/>
@@ -7138,7 +6984,7 @@
 </p:sld>
 </file>
 
-<file path=ppt/slides/slide13.xml><?xml version="1.0" encoding="utf-8"?>
+<file path=ppt/slides/slide12.xml><?xml version="1.0" encoding="utf-8"?>
 <p:sld xmlns:a="http://schemas.openxmlformats.org/drawingml/2006/main" xmlns:r="http://schemas.openxmlformats.org/officeDocument/2006/relationships" xmlns:p="http://schemas.openxmlformats.org/presentationml/2006/main">
   <p:cSld>
     <p:spTree>
@@ -7318,7 +7164,7 @@
 </p:sld>
 </file>
 
-<file path=ppt/slides/slide14.xml><?xml version="1.0" encoding="utf-8"?>
+<file path=ppt/slides/slide13.xml><?xml version="1.0" encoding="utf-8"?>
 <p:sld xmlns:a="http://schemas.openxmlformats.org/drawingml/2006/main" xmlns:r="http://schemas.openxmlformats.org/officeDocument/2006/relationships" xmlns:p="http://schemas.openxmlformats.org/presentationml/2006/main">
   <p:cSld>
     <p:spTree>
@@ -7402,7 +7248,7 @@
 </p:sld>
 </file>
 
-<file path=ppt/slides/slide15.xml><?xml version="1.0" encoding="utf-8"?>
+<file path=ppt/slides/slide14.xml><?xml version="1.0" encoding="utf-8"?>
 <p:sld xmlns:a="http://schemas.openxmlformats.org/drawingml/2006/main" xmlns:r="http://schemas.openxmlformats.org/officeDocument/2006/relationships" xmlns:p="http://schemas.openxmlformats.org/presentationml/2006/main">
   <p:cSld>
     <p:spTree>
@@ -7489,7 +7335,7 @@
 </p:sld>
 </file>
 
-<file path=ppt/slides/slide16.xml><?xml version="1.0" encoding="utf-8"?>
+<file path=ppt/slides/slide15.xml><?xml version="1.0" encoding="utf-8"?>
 <p:sld xmlns:a="http://schemas.openxmlformats.org/drawingml/2006/main" xmlns:r="http://schemas.openxmlformats.org/officeDocument/2006/relationships" xmlns:p="http://schemas.openxmlformats.org/presentationml/2006/main">
   <p:cSld>
     <p:spTree>
@@ -7614,7 +7460,7 @@
 </p:sld>
 </file>
 
-<file path=ppt/slides/slide17.xml><?xml version="1.0" encoding="utf-8"?>
+<file path=ppt/slides/slide16.xml><?xml version="1.0" encoding="utf-8"?>
 <p:sld xmlns:a="http://schemas.openxmlformats.org/drawingml/2006/main" xmlns:r="http://schemas.openxmlformats.org/officeDocument/2006/relationships" xmlns:p="http://schemas.openxmlformats.org/presentationml/2006/main">
   <p:cSld>
     <p:spTree>
@@ -7704,7 +7550,7 @@
 </p:sld>
 </file>
 
-<file path=ppt/slides/slide18.xml><?xml version="1.0" encoding="utf-8"?>
+<file path=ppt/slides/slide17.xml><?xml version="1.0" encoding="utf-8"?>
 <p:sld xmlns:a="http://schemas.openxmlformats.org/drawingml/2006/main" xmlns:r="http://schemas.openxmlformats.org/officeDocument/2006/relationships" xmlns:p="http://schemas.openxmlformats.org/presentationml/2006/main">
   <p:cSld>
     <p:spTree>
@@ -7874,7 +7720,7 @@
 </p:sld>
 </file>
 
-<file path=ppt/slides/slide19.xml><?xml version="1.0" encoding="utf-8"?>
+<file path=ppt/slides/slide18.xml><?xml version="1.0" encoding="utf-8"?>
 <p:sld xmlns:a="http://schemas.openxmlformats.org/drawingml/2006/main" xmlns:r="http://schemas.openxmlformats.org/officeDocument/2006/relationships" xmlns:p="http://schemas.openxmlformats.org/presentationml/2006/main">
   <p:cSld>
     <p:spTree>
@@ -8007,6 +7853,157 @@
 </p:sld>
 </file>
 
+<file path=ppt/slides/slide19.xml><?xml version="1.0" encoding="utf-8"?>
+<p:sld xmlns:a="http://schemas.openxmlformats.org/drawingml/2006/main" xmlns:r="http://schemas.openxmlformats.org/officeDocument/2006/relationships" xmlns:p="http://schemas.openxmlformats.org/presentationml/2006/main">
+  <p:cSld>
+    <p:spTree>
+      <p:nvGrpSpPr>
+        <p:cNvPr id="1" name=""/>
+        <p:cNvGrpSpPr/>
+        <p:nvPr/>
+      </p:nvGrpSpPr>
+      <p:grpSpPr>
+        <a:xfrm>
+          <a:off x="0" y="0"/>
+          <a:ext cx="0" cy="0"/>
+          <a:chOff x="0" y="0"/>
+          <a:chExt cx="0" cy="0"/>
+        </a:xfrm>
+      </p:grpSpPr>
+      <p:sp>
+        <p:nvSpPr>
+          <p:cNvPr id="3" name="Content Placeholder 2"/>
+          <p:cNvSpPr>
+            <a:spLocks noGrp="1"/>
+          </p:cNvSpPr>
+          <p:nvPr>
+            <p:ph idx="1"/>
+          </p:nvPr>
+        </p:nvSpPr>
+        <p:spPr>
+          <a:xfrm>
+            <a:off x="407505" y="318052"/>
+            <a:ext cx="8229600" cy="5178287"/>
+          </a:xfrm>
+        </p:spPr>
+        <p:txBody>
+          <a:bodyPr>
+            <a:normAutofit/>
+          </a:bodyPr>
+          <a:lstStyle/>
+          <a:p>
+            <a:pPr marL="0" indent="0" algn="ctr">
+              <a:buNone/>
+            </a:pPr>
+            <a:r>
+              <a:rPr lang="en-US" sz="3000" dirty="0">
+                <a:solidFill>
+                  <a:schemeClr val="accent1">
+                    <a:lumMod val="75000"/>
+                  </a:schemeClr>
+                </a:solidFill>
+                <a:latin typeface="Times New Roman" panose="02020603050405020304" pitchFamily="18" charset="0"/>
+                <a:cs typeface="Times New Roman" panose="02020603050405020304" pitchFamily="18" charset="0"/>
+              </a:rPr>
+              <a:t>What ISAM Does?</a:t>
+            </a:r>
+          </a:p>
+          <a:p>
+            <a:endParaRPr lang="en-US" sz="2000" dirty="0">
+              <a:latin typeface="Times New Roman" panose="02020603050405020304" pitchFamily="18" charset="0"/>
+              <a:cs typeface="Times New Roman" panose="02020603050405020304" pitchFamily="18" charset="0"/>
+            </a:endParaRPr>
+          </a:p>
+          <a:p>
+            <a:endParaRPr lang="en-US" sz="2000" dirty="0">
+              <a:latin typeface="Times New Roman" panose="02020603050405020304" pitchFamily="18" charset="0"/>
+              <a:cs typeface="Times New Roman" panose="02020603050405020304" pitchFamily="18" charset="0"/>
+            </a:endParaRPr>
+          </a:p>
+          <a:p>
+            <a:r>
+              <a:rPr lang="en-US" sz="2000" dirty="0">
+                <a:latin typeface="Times New Roman" panose="02020603050405020304" pitchFamily="18" charset="0"/>
+                <a:cs typeface="Times New Roman" panose="02020603050405020304" pitchFamily="18" charset="0"/>
+              </a:rPr>
+              <a:t>ISAM providers will develop proprietary algorithms</a:t>
+            </a:r>
+          </a:p>
+          <a:p>
+            <a:endParaRPr lang="en-US" sz="2000" dirty="0">
+              <a:latin typeface="Times New Roman" panose="02020603050405020304" pitchFamily="18" charset="0"/>
+              <a:cs typeface="Times New Roman" panose="02020603050405020304" pitchFamily="18" charset="0"/>
+            </a:endParaRPr>
+          </a:p>
+          <a:p>
+            <a:r>
+              <a:rPr lang="en-US" sz="2000" dirty="0">
+                <a:latin typeface="Times New Roman" panose="02020603050405020304" pitchFamily="18" charset="0"/>
+                <a:cs typeface="Times New Roman" panose="02020603050405020304" pitchFamily="18" charset="0"/>
+              </a:rPr>
+              <a:t>Make custom assessment reports</a:t>
+            </a:r>
+          </a:p>
+          <a:p>
+            <a:endParaRPr lang="en-US" sz="2000" dirty="0">
+              <a:latin typeface="Times New Roman" panose="02020603050405020304" pitchFamily="18" charset="0"/>
+              <a:cs typeface="Times New Roman" panose="02020603050405020304" pitchFamily="18" charset="0"/>
+            </a:endParaRPr>
+          </a:p>
+          <a:p>
+            <a:r>
+              <a:rPr lang="en-US" sz="2000" dirty="0">
+                <a:latin typeface="Times New Roman" panose="02020603050405020304" pitchFamily="18" charset="0"/>
+                <a:cs typeface="Times New Roman" panose="02020603050405020304" pitchFamily="18" charset="0"/>
+              </a:rPr>
+              <a:t>Reports Updated Frequently</a:t>
+            </a:r>
+          </a:p>
+          <a:p>
+            <a:endParaRPr lang="en-US" sz="2000" dirty="0">
+              <a:latin typeface="Times New Roman" panose="02020603050405020304" pitchFamily="18" charset="0"/>
+              <a:cs typeface="Times New Roman" panose="02020603050405020304" pitchFamily="18" charset="0"/>
+            </a:endParaRPr>
+          </a:p>
+          <a:p>
+            <a:r>
+              <a:rPr lang="en-US" sz="2000" dirty="0">
+                <a:latin typeface="Times New Roman" panose="02020603050405020304" pitchFamily="18" charset="0"/>
+                <a:cs typeface="Times New Roman" panose="02020603050405020304" pitchFamily="18" charset="0"/>
+              </a:rPr>
+              <a:t>Customers will benefit from these reports</a:t>
+            </a:r>
+          </a:p>
+          <a:p>
+            <a:endParaRPr lang="en-US" sz="2000" dirty="0">
+              <a:latin typeface="Times New Roman" panose="02020603050405020304" pitchFamily="18" charset="0"/>
+              <a:cs typeface="Times New Roman" panose="02020603050405020304" pitchFamily="18" charset="0"/>
+            </a:endParaRPr>
+          </a:p>
+          <a:p>
+            <a:r>
+              <a:rPr lang="en-US" sz="2000" dirty="0">
+                <a:latin typeface="Times New Roman" panose="02020603050405020304" pitchFamily="18" charset="0"/>
+                <a:cs typeface="Times New Roman" panose="02020603050405020304" pitchFamily="18" charset="0"/>
+              </a:rPr>
+              <a:t>ISAM makes the basic data public so that it benefits the overall ecosystem</a:t>
+            </a:r>
+          </a:p>
+        </p:txBody>
+      </p:sp>
+    </p:spTree>
+    <p:extLst>
+      <p:ext uri="{BB962C8B-B14F-4D97-AF65-F5344CB8AC3E}">
+        <p14:creationId xmlns:p14="http://schemas.microsoft.com/office/powerpoint/2010/main" val="3941983492"/>
+      </p:ext>
+    </p:extLst>
+  </p:cSld>
+  <p:clrMapOvr>
+    <a:masterClrMapping/>
+  </p:clrMapOvr>
+</p:sld>
+</file>
+
 <file path=ppt/slides/slide2.xml><?xml version="1.0" encoding="utf-8"?>
 <p:sld xmlns:a="http://schemas.openxmlformats.org/drawingml/2006/main" xmlns:r="http://schemas.openxmlformats.org/officeDocument/2006/relationships" xmlns:p="http://schemas.openxmlformats.org/presentationml/2006/main">
   <p:cSld>
@@ -8174,157 +8171,6 @@
         </p:nvSpPr>
         <p:spPr>
           <a:xfrm>
-            <a:off x="407505" y="318052"/>
-            <a:ext cx="8229600" cy="5178287"/>
-          </a:xfrm>
-        </p:spPr>
-        <p:txBody>
-          <a:bodyPr>
-            <a:normAutofit/>
-          </a:bodyPr>
-          <a:lstStyle/>
-          <a:p>
-            <a:pPr marL="0" indent="0" algn="ctr">
-              <a:buNone/>
-            </a:pPr>
-            <a:r>
-              <a:rPr lang="en-US" sz="3000" dirty="0">
-                <a:solidFill>
-                  <a:schemeClr val="accent1">
-                    <a:lumMod val="75000"/>
-                  </a:schemeClr>
-                </a:solidFill>
-                <a:latin typeface="Times New Roman" panose="02020603050405020304" pitchFamily="18" charset="0"/>
-                <a:cs typeface="Times New Roman" panose="02020603050405020304" pitchFamily="18" charset="0"/>
-              </a:rPr>
-              <a:t>What ISAM Does?</a:t>
-            </a:r>
-          </a:p>
-          <a:p>
-            <a:endParaRPr lang="en-US" sz="2000" dirty="0">
-              <a:latin typeface="Times New Roman" panose="02020603050405020304" pitchFamily="18" charset="0"/>
-              <a:cs typeface="Times New Roman" panose="02020603050405020304" pitchFamily="18" charset="0"/>
-            </a:endParaRPr>
-          </a:p>
-          <a:p>
-            <a:endParaRPr lang="en-US" sz="2000" dirty="0">
-              <a:latin typeface="Times New Roman" panose="02020603050405020304" pitchFamily="18" charset="0"/>
-              <a:cs typeface="Times New Roman" panose="02020603050405020304" pitchFamily="18" charset="0"/>
-            </a:endParaRPr>
-          </a:p>
-          <a:p>
-            <a:r>
-              <a:rPr lang="en-US" sz="2000" dirty="0">
-                <a:latin typeface="Times New Roman" panose="02020603050405020304" pitchFamily="18" charset="0"/>
-                <a:cs typeface="Times New Roman" panose="02020603050405020304" pitchFamily="18" charset="0"/>
-              </a:rPr>
-              <a:t>ISAM providers will develop proprietary algorithms</a:t>
-            </a:r>
-          </a:p>
-          <a:p>
-            <a:endParaRPr lang="en-US" sz="2000" dirty="0">
-              <a:latin typeface="Times New Roman" panose="02020603050405020304" pitchFamily="18" charset="0"/>
-              <a:cs typeface="Times New Roman" panose="02020603050405020304" pitchFamily="18" charset="0"/>
-            </a:endParaRPr>
-          </a:p>
-          <a:p>
-            <a:r>
-              <a:rPr lang="en-US" sz="2000" dirty="0">
-                <a:latin typeface="Times New Roman" panose="02020603050405020304" pitchFamily="18" charset="0"/>
-                <a:cs typeface="Times New Roman" panose="02020603050405020304" pitchFamily="18" charset="0"/>
-              </a:rPr>
-              <a:t>Make custom assessment reports</a:t>
-            </a:r>
-          </a:p>
-          <a:p>
-            <a:endParaRPr lang="en-US" sz="2000" dirty="0">
-              <a:latin typeface="Times New Roman" panose="02020603050405020304" pitchFamily="18" charset="0"/>
-              <a:cs typeface="Times New Roman" panose="02020603050405020304" pitchFamily="18" charset="0"/>
-            </a:endParaRPr>
-          </a:p>
-          <a:p>
-            <a:r>
-              <a:rPr lang="en-US" sz="2000" dirty="0">
-                <a:latin typeface="Times New Roman" panose="02020603050405020304" pitchFamily="18" charset="0"/>
-                <a:cs typeface="Times New Roman" panose="02020603050405020304" pitchFamily="18" charset="0"/>
-              </a:rPr>
-              <a:t>Reports Updated Frequently</a:t>
-            </a:r>
-          </a:p>
-          <a:p>
-            <a:endParaRPr lang="en-US" sz="2000" dirty="0">
-              <a:latin typeface="Times New Roman" panose="02020603050405020304" pitchFamily="18" charset="0"/>
-              <a:cs typeface="Times New Roman" panose="02020603050405020304" pitchFamily="18" charset="0"/>
-            </a:endParaRPr>
-          </a:p>
-          <a:p>
-            <a:r>
-              <a:rPr lang="en-US" sz="2000" dirty="0">
-                <a:latin typeface="Times New Roman" panose="02020603050405020304" pitchFamily="18" charset="0"/>
-                <a:cs typeface="Times New Roman" panose="02020603050405020304" pitchFamily="18" charset="0"/>
-              </a:rPr>
-              <a:t>Customers will benefit from these reports</a:t>
-            </a:r>
-          </a:p>
-          <a:p>
-            <a:endParaRPr lang="en-US" sz="2000" dirty="0">
-              <a:latin typeface="Times New Roman" panose="02020603050405020304" pitchFamily="18" charset="0"/>
-              <a:cs typeface="Times New Roman" panose="02020603050405020304" pitchFamily="18" charset="0"/>
-            </a:endParaRPr>
-          </a:p>
-          <a:p>
-            <a:r>
-              <a:rPr lang="en-US" sz="2000" dirty="0">
-                <a:latin typeface="Times New Roman" panose="02020603050405020304" pitchFamily="18" charset="0"/>
-                <a:cs typeface="Times New Roman" panose="02020603050405020304" pitchFamily="18" charset="0"/>
-              </a:rPr>
-              <a:t>ISAM makes the basic data public so that it benefits the overall ecosystem</a:t>
-            </a:r>
-          </a:p>
-        </p:txBody>
-      </p:sp>
-    </p:spTree>
-    <p:extLst>
-      <p:ext uri="{BB962C8B-B14F-4D97-AF65-F5344CB8AC3E}">
-        <p14:creationId xmlns:p14="http://schemas.microsoft.com/office/powerpoint/2010/main" val="3941983492"/>
-      </p:ext>
-    </p:extLst>
-  </p:cSld>
-  <p:clrMapOvr>
-    <a:masterClrMapping/>
-  </p:clrMapOvr>
-</p:sld>
-</file>
-
-<file path=ppt/slides/slide21.xml><?xml version="1.0" encoding="utf-8"?>
-<p:sld xmlns:a="http://schemas.openxmlformats.org/drawingml/2006/main" xmlns:r="http://schemas.openxmlformats.org/officeDocument/2006/relationships" xmlns:p="http://schemas.openxmlformats.org/presentationml/2006/main">
-  <p:cSld>
-    <p:spTree>
-      <p:nvGrpSpPr>
-        <p:cNvPr id="1" name=""/>
-        <p:cNvGrpSpPr/>
-        <p:nvPr/>
-      </p:nvGrpSpPr>
-      <p:grpSpPr>
-        <a:xfrm>
-          <a:off x="0" y="0"/>
-          <a:ext cx="0" cy="0"/>
-          <a:chOff x="0" y="0"/>
-          <a:chExt cx="0" cy="0"/>
-        </a:xfrm>
-      </p:grpSpPr>
-      <p:sp>
-        <p:nvSpPr>
-          <p:cNvPr id="3" name="Content Placeholder 2"/>
-          <p:cNvSpPr>
-            <a:spLocks noGrp="1"/>
-          </p:cNvSpPr>
-          <p:nvPr>
-            <p:ph idx="1"/>
-          </p:nvPr>
-        </p:nvSpPr>
-        <p:spPr>
-          <a:xfrm>
             <a:off x="536713" y="795130"/>
             <a:ext cx="8229600" cy="5287618"/>
           </a:xfrm>
@@ -8463,7 +8309,7 @@
 </p:sld>
 </file>
 
-<file path=ppt/slides/slide22.xml><?xml version="1.0" encoding="utf-8"?>
+<file path=ppt/slides/slide21.xml><?xml version="1.0" encoding="utf-8"?>
 <p:sld xmlns:a="http://schemas.openxmlformats.org/drawingml/2006/main" xmlns:r="http://schemas.openxmlformats.org/officeDocument/2006/relationships" xmlns:p="http://schemas.openxmlformats.org/presentationml/2006/main">
   <p:cSld>
     <p:spTree>
@@ -8516,7 +8362,7 @@
 </p:sld>
 </file>
 
-<file path=ppt/slides/slide23.xml><?xml version="1.0" encoding="utf-8"?>
+<file path=ppt/slides/slide22.xml><?xml version="1.0" encoding="utf-8"?>
 <p:sld xmlns:a="http://schemas.openxmlformats.org/drawingml/2006/main" xmlns:r="http://schemas.openxmlformats.org/officeDocument/2006/relationships" xmlns:p="http://schemas.openxmlformats.org/presentationml/2006/main">
   <p:cSld>
     <p:spTree>
@@ -9380,8 +9226,8 @@
           </a:p>
           <a:p>
             <a:endParaRPr lang="en-US" sz="2400" dirty="0">
-              <a:latin typeface="Times New Roman" pitchFamily="18" charset="0"/>
-              <a:cs typeface="Times New Roman" pitchFamily="18" charset="0"/>
+              <a:latin typeface="Times New Roman" panose="02020603050405020304" pitchFamily="18" charset="0"/>
+              <a:cs typeface="Times New Roman" panose="02020603050405020304" pitchFamily="18" charset="0"/>
             </a:endParaRPr>
           </a:p>
         </p:txBody>

</xml_diff>